<commit_message>
Presentation with runtime values
</commit_message>
<xml_diff>
--- a/ParallelCC_Pres2 - gus.pptx
+++ b/ParallelCC_Pres2 - gus.pptx
@@ -7951,14 +7951,14 @@
             <p:ph idx="1"/>
             <p:extLst>
               <p:ext uri="{D42A27DB-BD31-4B8C-83A1-F6EECF244321}">
-                <p14:modId xmlns:p14="http://schemas.microsoft.com/office/powerpoint/2010/main" val="326317940"/>
+                <p14:modId xmlns:p14="http://schemas.microsoft.com/office/powerpoint/2010/main" val="3235218667"/>
               </p:ext>
             </p:extLst>
           </p:nvPr>
         </p:nvGraphicFramePr>
         <p:xfrm>
-          <a:off x="169334" y="2167465"/>
-          <a:ext cx="11961707" cy="4071513"/>
+          <a:off x="339937" y="2118317"/>
+          <a:ext cx="11579014" cy="4373923"/>
         </p:xfrm>
         <a:graphic>
           <a:graphicData uri="http://schemas.openxmlformats.org/drawingml/2006/table">
@@ -7967,10 +7967,10 @@
                 <a:tableStyleId>{5C22544A-7EE6-4342-B048-85BDC9FD1C3A}</a:tableStyleId>
               </a:tblPr>
               <a:tblGrid>
-                <a:gridCol w="3542453"/>
-                <a:gridCol w="1517227"/>
-                <a:gridCol w="4328159"/>
-                <a:gridCol w="2573868"/>
+                <a:gridCol w="3429119"/>
+                <a:gridCol w="1468686"/>
+                <a:gridCol w="5394880"/>
+                <a:gridCol w="1286329"/>
               </a:tblGrid>
               <a:tr h="348023">
                 <a:tc>
@@ -8082,6 +8082,10 @@
                     <a:bodyPr/>
                     <a:lstStyle/>
                     <a:p>
+                      <a:r>
+                        <a:rPr lang="en-US" dirty="0" smtClean="0"/>
+                        <a:t>~5.4s</a:t>
+                      </a:r>
                       <a:endParaRPr lang="en-US" dirty="0"/>
                     </a:p>
                   </a:txBody>
@@ -8108,31 +8112,23 @@
                     <a:bodyPr/>
                     <a:lstStyle/>
                     <a:p>
-                      <a:pPr marL="0" marR="0" indent="0" algn="l" defTabSz="914400" rtl="0" eaLnBrk="1" fontAlgn="auto" latinLnBrk="0" hangingPunct="1">
-                        <a:lnSpc>
-                          <a:spcPct val="100000"/>
-                        </a:lnSpc>
-                        <a:spcBef>
-                          <a:spcPts val="0"/>
-                        </a:spcBef>
-                        <a:spcAft>
-                          <a:spcPts val="0"/>
-                        </a:spcAft>
-                        <a:buClrTx/>
-                        <a:buSzTx/>
-                        <a:buFontTx/>
-                        <a:buNone/>
-                        <a:tabLst/>
-                        <a:defRPr/>
-                      </a:pPr>
                       <a:r>
                         <a:rPr lang="en-US" dirty="0" smtClean="0">
                           <a:solidFill>
-                            <a:srgbClr val="00B050"/>
+                            <a:schemeClr val="accent1">
+                              <a:lumMod val="75000"/>
+                            </a:schemeClr>
                           </a:solidFill>
                         </a:rPr>
-                        <a:t>OK</a:t>
+                        <a:t>In progress</a:t>
                       </a:r>
+                      <a:endParaRPr lang="en-US" dirty="0">
+                        <a:solidFill>
+                          <a:schemeClr val="accent1">
+                            <a:lumMod val="75000"/>
+                          </a:schemeClr>
+                        </a:solidFill>
+                      </a:endParaRPr>
                     </a:p>
                   </a:txBody>
                   <a:tcPr/>
@@ -8142,7 +8138,15 @@
                     <a:bodyPr/>
                     <a:lstStyle/>
                     <a:p>
-                      <a:endParaRPr lang="en-US" sz="1400"/>
+                      <a:r>
+                        <a:rPr lang="en-US" sz="1400" dirty="0" smtClean="0"/>
+                        <a:t>Half of the time spent merging. Verifying if can</a:t>
+                      </a:r>
+                      <a:r>
+                        <a:rPr lang="en-US" sz="1400" baseline="0" dirty="0" smtClean="0"/>
+                        <a:t> optimize.</a:t>
+                      </a:r>
+                      <a:endParaRPr lang="en-US" sz="1400" dirty="0"/>
                     </a:p>
                   </a:txBody>
                   <a:tcPr/>
@@ -8152,7 +8156,11 @@
                     <a:bodyPr/>
                     <a:lstStyle/>
                     <a:p>
-                      <a:endParaRPr lang="en-US"/>
+                      <a:r>
+                        <a:rPr lang="en-US" dirty="0" smtClean="0"/>
+                        <a:t>~5.2s</a:t>
+                      </a:r>
+                      <a:endParaRPr lang="en-US" dirty="0"/>
                     </a:p>
                   </a:txBody>
                   <a:tcPr/>
@@ -8181,12 +8189,20 @@
                       <a:r>
                         <a:rPr lang="en-US" dirty="0" smtClean="0">
                           <a:solidFill>
-                            <a:srgbClr val="00B050"/>
+                            <a:schemeClr val="accent1">
+                              <a:lumMod val="75000"/>
+                            </a:schemeClr>
                           </a:solidFill>
                         </a:rPr>
-                        <a:t>OK</a:t>
+                        <a:t>In progress</a:t>
                       </a:r>
-                      <a:endParaRPr lang="en-US" dirty="0"/>
+                      <a:endParaRPr lang="en-US" dirty="0">
+                        <a:solidFill>
+                          <a:schemeClr val="accent1">
+                            <a:lumMod val="75000"/>
+                          </a:schemeClr>
+                        </a:solidFill>
+                      </a:endParaRPr>
                     </a:p>
                   </a:txBody>
                   <a:tcPr/>
@@ -8196,7 +8212,32 @@
                     <a:bodyPr/>
                     <a:lstStyle/>
                     <a:p>
-                      <a:endParaRPr lang="en-US" sz="1400"/>
+                      <a:pPr marL="0" marR="0" indent="0" algn="l" defTabSz="914400" rtl="0" eaLnBrk="1" fontAlgn="auto" latinLnBrk="0" hangingPunct="1">
+                        <a:lnSpc>
+                          <a:spcPct val="100000"/>
+                        </a:lnSpc>
+                        <a:spcBef>
+                          <a:spcPts val="0"/>
+                        </a:spcBef>
+                        <a:spcAft>
+                          <a:spcPts val="0"/>
+                        </a:spcAft>
+                        <a:buClrTx/>
+                        <a:buSzTx/>
+                        <a:buFontTx/>
+                        <a:buNone/>
+                        <a:tabLst/>
+                        <a:defRPr/>
+                      </a:pPr>
+                      <a:r>
+                        <a:rPr lang="en-US" sz="1400" dirty="0" smtClean="0"/>
+                        <a:t>Half of the time spent merging. Verifying if can</a:t>
+                      </a:r>
+                      <a:r>
+                        <a:rPr lang="en-US" sz="1400" baseline="0" dirty="0" smtClean="0"/>
+                        <a:t> optimize.</a:t>
+                      </a:r>
+                      <a:endParaRPr lang="en-US" sz="1400" dirty="0" smtClean="0"/>
                     </a:p>
                   </a:txBody>
                   <a:tcPr/>
@@ -8206,7 +8247,27 @@
                     <a:bodyPr/>
                     <a:lstStyle/>
                     <a:p>
-                      <a:endParaRPr lang="en-US"/>
+                      <a:pPr marL="0" marR="0" indent="0" algn="l" defTabSz="914400" rtl="0" eaLnBrk="1" fontAlgn="auto" latinLnBrk="0" hangingPunct="1">
+                        <a:lnSpc>
+                          <a:spcPct val="100000"/>
+                        </a:lnSpc>
+                        <a:spcBef>
+                          <a:spcPts val="0"/>
+                        </a:spcBef>
+                        <a:spcAft>
+                          <a:spcPts val="0"/>
+                        </a:spcAft>
+                        <a:buClrTx/>
+                        <a:buSzTx/>
+                        <a:buFontTx/>
+                        <a:buNone/>
+                        <a:tabLst/>
+                        <a:defRPr/>
+                      </a:pPr>
+                      <a:r>
+                        <a:rPr lang="en-US" dirty="0" smtClean="0"/>
+                        <a:t>~5.2s</a:t>
+                      </a:r>
                     </a:p>
                   </a:txBody>
                   <a:tcPr/>
@@ -8264,7 +8325,27 @@
                     <a:bodyPr/>
                     <a:lstStyle/>
                     <a:p>
-                      <a:endParaRPr lang="en-US" dirty="0"/>
+                      <a:pPr marL="0" marR="0" indent="0" algn="l" defTabSz="914400" rtl="0" eaLnBrk="1" fontAlgn="auto" latinLnBrk="0" hangingPunct="1">
+                        <a:lnSpc>
+                          <a:spcPct val="100000"/>
+                        </a:lnSpc>
+                        <a:spcBef>
+                          <a:spcPts val="0"/>
+                        </a:spcBef>
+                        <a:spcAft>
+                          <a:spcPts val="0"/>
+                        </a:spcAft>
+                        <a:buClrTx/>
+                        <a:buSzTx/>
+                        <a:buFontTx/>
+                        <a:buNone/>
+                        <a:tabLst/>
+                        <a:defRPr/>
+                      </a:pPr>
+                      <a:r>
+                        <a:rPr lang="en-US" dirty="0" smtClean="0"/>
+                        <a:t>~1.8s</a:t>
+                      </a:r>
                     </a:p>
                   </a:txBody>
                   <a:tcPr/>
@@ -8318,6 +8399,10 @@
                     <a:bodyPr/>
                     <a:lstStyle/>
                     <a:p>
+                      <a:r>
+                        <a:rPr lang="en-US" dirty="0" smtClean="0"/>
+                        <a:t>~1.7s</a:t>
+                      </a:r>
                       <a:endParaRPr lang="en-US" dirty="0"/>
                     </a:p>
                   </a:txBody>
@@ -8376,6 +8461,10 @@
                     <a:bodyPr/>
                     <a:lstStyle/>
                     <a:p>
+                      <a:r>
+                        <a:rPr lang="en-US" dirty="0" smtClean="0"/>
+                        <a:t>~23.2s</a:t>
+                      </a:r>
                       <a:endParaRPr lang="en-US" dirty="0"/>
                     </a:p>
                   </a:txBody>
@@ -8467,6 +8556,10 @@
                     <a:bodyPr/>
                     <a:lstStyle/>
                     <a:p>
+                      <a:r>
+                        <a:rPr lang="en-US" dirty="0" smtClean="0"/>
+                        <a:t>~15.7s</a:t>
+                      </a:r>
                       <a:endParaRPr lang="en-US" dirty="0"/>
                     </a:p>
                   </a:txBody>
@@ -8542,13 +8635,17 @@
                     <a:bodyPr/>
                     <a:lstStyle/>
                     <a:p>
+                      <a:r>
+                        <a:rPr lang="en-US" dirty="0" smtClean="0"/>
+                        <a:t>~16.5s</a:t>
+                      </a:r>
                       <a:endParaRPr lang="en-US" dirty="0"/>
                     </a:p>
                   </a:txBody>
                   <a:tcPr/>
                 </a:tc>
               </a:tr>
-              <a:tr h="611990">
+              <a:tr h="316612">
                 <a:tc>
                   <a:txBody>
                     <a:bodyPr/>
@@ -8614,7 +8711,19 @@
                       </a:r>
                       <a:r>
                         <a:rPr lang="en-US" sz="1400" baseline="0" dirty="0" smtClean="0"/>
-                        <a:t> of the parallel boost implementation is more difficult than expected</a:t>
+                        <a:t> of the parallel boost implementation is more difficult than </a:t>
+                      </a:r>
+                      <a:r>
+                        <a:rPr lang="en-US" sz="1400" baseline="0" dirty="0" smtClean="0"/>
+                        <a:t>expected. Was not yet able to run </a:t>
+                      </a:r>
+                      <a:r>
+                        <a:rPr lang="en-US" sz="1400" baseline="0" dirty="0" err="1" smtClean="0"/>
+                        <a:t>benchmar</a:t>
+                      </a:r>
+                      <a:r>
+                        <a:rPr lang="en-US" sz="1400" baseline="0" dirty="0" smtClean="0"/>
+                        <a:t>.</a:t>
                       </a:r>
                       <a:endParaRPr lang="en-US" sz="1400" dirty="0"/>
                     </a:p>
@@ -8626,6 +8735,10 @@
                     <a:bodyPr/>
                     <a:lstStyle/>
                     <a:p>
+                      <a:r>
+                        <a:rPr lang="en-US" dirty="0" smtClean="0"/>
+                        <a:t>n/a</a:t>
+                      </a:r>
                       <a:endParaRPr lang="en-US" dirty="0"/>
                     </a:p>
                   </a:txBody>
@@ -8644,8 +8757,8 @@
         </p:nvSpPr>
         <p:spPr>
           <a:xfrm>
-            <a:off x="155786" y="6421120"/>
-            <a:ext cx="7059368" cy="369332"/>
+            <a:off x="263736" y="6488668"/>
+            <a:ext cx="8359724" cy="369332"/>
           </a:xfrm>
           <a:prstGeom prst="rect">
             <a:avLst/>
@@ -8660,7 +8773,19 @@
           <a:p>
             <a:r>
               <a:rPr lang="en-US" dirty="0" smtClean="0"/>
-              <a:t>* Run on graph with 10 components, XXXX vertices and YYYY edges</a:t>
+              <a:t>* Run on graph with 10 components, </a:t>
+            </a:r>
+            <a:r>
+              <a:rPr lang="en-US" dirty="0" smtClean="0"/>
+              <a:t>2.75 million vertices </a:t>
+            </a:r>
+            <a:r>
+              <a:rPr lang="en-US" dirty="0" smtClean="0"/>
+              <a:t>and </a:t>
+            </a:r>
+            <a:r>
+              <a:rPr lang="en-US" dirty="0" smtClean="0"/>
+              <a:t>~20 million edges</a:t>
             </a:r>
             <a:endParaRPr lang="en-US" dirty="0"/>
           </a:p>

</xml_diff>